<commit_message>
Update Constrains in wheat  production - theory.pptx
Bold Title
</commit_message>
<xml_diff>
--- a/Constrains in wheat  production - theory.pptx
+++ b/Constrains in wheat  production - theory.pptx
@@ -126,6 +126,22 @@
       </a:defRPr>
     </a:lvl9pPr>
   </p:defaultTextStyle>
+  <p:extLst>
+    <p:ext uri="{EFAFB233-063F-42B5-8137-9DF3F51BA10A}">
+      <p15:sldGuideLst xmlns:p15="http://schemas.microsoft.com/office/powerpoint/2012/main">
+        <p15:guide id="1" orient="horz" pos="2160">
+          <p15:clr>
+            <a:srgbClr val="A4A3A4"/>
+          </p15:clr>
+        </p15:guide>
+        <p15:guide id="2" pos="2880">
+          <p15:clr>
+            <a:srgbClr val="A4A3A4"/>
+          </p15:clr>
+        </p15:guide>
+      </p15:sldGuideLst>
+    </p:ext>
+  </p:extLst>
 </p:presentation>
 </file>
 
@@ -167,10 +183,9 @@
           <a:lstStyle/>
           <a:p>
             <a:r>
-              <a:rPr lang="en-US" smtClean="0"/>
+              <a:rPr lang="en-US"/>
               <a:t>Click to edit Master title style</a:t>
             </a:r>
-            <a:endParaRPr lang="en-US"/>
           </a:p>
         </p:txBody>
       </p:sp>
@@ -286,10 +301,9 @@
           </a:lstStyle>
           <a:p>
             <a:r>
-              <a:rPr lang="en-US" smtClean="0"/>
+              <a:rPr lang="en-US"/>
               <a:t>Click to edit Master subtitle style</a:t>
             </a:r>
-            <a:endParaRPr lang="en-US"/>
           </a:p>
         </p:txBody>
       </p:sp>
@@ -399,10 +413,9 @@
           <a:lstStyle/>
           <a:p>
             <a:r>
-              <a:rPr lang="en-US" smtClean="0"/>
+              <a:rPr lang="en-US"/>
               <a:t>Click to edit Master title style</a:t>
             </a:r>
-            <a:endParaRPr lang="en-US"/>
           </a:p>
         </p:txBody>
       </p:sp>
@@ -423,38 +436,37 @@
           <a:p>
             <a:pPr lvl="0"/>
             <a:r>
-              <a:rPr lang="en-US" smtClean="0"/>
+              <a:rPr lang="en-US"/>
               <a:t>Click to edit Master text styles</a:t>
             </a:r>
           </a:p>
           <a:p>
             <a:pPr lvl="1"/>
             <a:r>
-              <a:rPr lang="en-US" smtClean="0"/>
+              <a:rPr lang="en-US"/>
               <a:t>Second level</a:t>
             </a:r>
           </a:p>
           <a:p>
             <a:pPr lvl="2"/>
             <a:r>
-              <a:rPr lang="en-US" smtClean="0"/>
+              <a:rPr lang="en-US"/>
               <a:t>Third level</a:t>
             </a:r>
           </a:p>
           <a:p>
             <a:pPr lvl="3"/>
             <a:r>
-              <a:rPr lang="en-US" smtClean="0"/>
+              <a:rPr lang="en-US"/>
               <a:t>Fourth level</a:t>
             </a:r>
           </a:p>
           <a:p>
             <a:pPr lvl="4"/>
             <a:r>
-              <a:rPr lang="en-US" smtClean="0"/>
+              <a:rPr lang="en-US"/>
               <a:t>Fifth level</a:t>
             </a:r>
-            <a:endParaRPr lang="en-US"/>
           </a:p>
         </p:txBody>
       </p:sp>
@@ -569,10 +581,9 @@
           <a:lstStyle/>
           <a:p>
             <a:r>
-              <a:rPr lang="en-US" smtClean="0"/>
+              <a:rPr lang="en-US"/>
               <a:t>Click to edit Master title style</a:t>
             </a:r>
-            <a:endParaRPr lang="en-US"/>
           </a:p>
         </p:txBody>
       </p:sp>
@@ -598,38 +609,37 @@
           <a:p>
             <a:pPr lvl="0"/>
             <a:r>
-              <a:rPr lang="en-US" smtClean="0"/>
+              <a:rPr lang="en-US"/>
               <a:t>Click to edit Master text styles</a:t>
             </a:r>
           </a:p>
           <a:p>
             <a:pPr lvl="1"/>
             <a:r>
-              <a:rPr lang="en-US" smtClean="0"/>
+              <a:rPr lang="en-US"/>
               <a:t>Second level</a:t>
             </a:r>
           </a:p>
           <a:p>
             <a:pPr lvl="2"/>
             <a:r>
-              <a:rPr lang="en-US" smtClean="0"/>
+              <a:rPr lang="en-US"/>
               <a:t>Third level</a:t>
             </a:r>
           </a:p>
           <a:p>
             <a:pPr lvl="3"/>
             <a:r>
-              <a:rPr lang="en-US" smtClean="0"/>
+              <a:rPr lang="en-US"/>
               <a:t>Fourth level</a:t>
             </a:r>
           </a:p>
           <a:p>
             <a:pPr lvl="4"/>
             <a:r>
-              <a:rPr lang="en-US" smtClean="0"/>
+              <a:rPr lang="en-US"/>
               <a:t>Fifth level</a:t>
             </a:r>
-            <a:endParaRPr lang="en-US"/>
           </a:p>
         </p:txBody>
       </p:sp>
@@ -739,10 +749,9 @@
           <a:lstStyle/>
           <a:p>
             <a:r>
-              <a:rPr lang="en-US" smtClean="0"/>
+              <a:rPr lang="en-US"/>
               <a:t>Click to edit Master title style</a:t>
             </a:r>
-            <a:endParaRPr lang="en-US"/>
           </a:p>
         </p:txBody>
       </p:sp>
@@ -763,38 +772,37 @@
           <a:p>
             <a:pPr lvl="0"/>
             <a:r>
-              <a:rPr lang="en-US" smtClean="0"/>
+              <a:rPr lang="en-US"/>
               <a:t>Click to edit Master text styles</a:t>
             </a:r>
           </a:p>
           <a:p>
             <a:pPr lvl="1"/>
             <a:r>
-              <a:rPr lang="en-US" smtClean="0"/>
+              <a:rPr lang="en-US"/>
               <a:t>Second level</a:t>
             </a:r>
           </a:p>
           <a:p>
             <a:pPr lvl="2"/>
             <a:r>
-              <a:rPr lang="en-US" smtClean="0"/>
+              <a:rPr lang="en-US"/>
               <a:t>Third level</a:t>
             </a:r>
           </a:p>
           <a:p>
             <a:pPr lvl="3"/>
             <a:r>
-              <a:rPr lang="en-US" smtClean="0"/>
+              <a:rPr lang="en-US"/>
               <a:t>Fourth level</a:t>
             </a:r>
           </a:p>
           <a:p>
             <a:pPr lvl="4"/>
             <a:r>
-              <a:rPr lang="en-US" smtClean="0"/>
+              <a:rPr lang="en-US"/>
               <a:t>Fifth level</a:t>
             </a:r>
-            <a:endParaRPr lang="en-US"/>
           </a:p>
         </p:txBody>
       </p:sp>
@@ -913,10 +921,9 @@
           </a:lstStyle>
           <a:p>
             <a:r>
-              <a:rPr lang="en-US" smtClean="0"/>
+              <a:rPr lang="en-US"/>
               <a:t>Click to edit Master title style</a:t>
             </a:r>
-            <a:endParaRPr lang="en-US"/>
           </a:p>
         </p:txBody>
       </p:sp>
@@ -1033,7 +1040,7 @@
           <a:p>
             <a:pPr lvl="0"/>
             <a:r>
-              <a:rPr lang="en-US" smtClean="0"/>
+              <a:rPr lang="en-US"/>
               <a:t>Click to edit Master text styles</a:t>
             </a:r>
           </a:p>
@@ -1145,10 +1152,9 @@
           <a:lstStyle/>
           <a:p>
             <a:r>
-              <a:rPr lang="en-US" smtClean="0"/>
+              <a:rPr lang="en-US"/>
               <a:t>Click to edit Master title style</a:t>
             </a:r>
-            <a:endParaRPr lang="en-US"/>
           </a:p>
         </p:txBody>
       </p:sp>
@@ -1202,38 +1208,37 @@
           <a:p>
             <a:pPr lvl="0"/>
             <a:r>
-              <a:rPr lang="en-US" smtClean="0"/>
+              <a:rPr lang="en-US"/>
               <a:t>Click to edit Master text styles</a:t>
             </a:r>
           </a:p>
           <a:p>
             <a:pPr lvl="1"/>
             <a:r>
-              <a:rPr lang="en-US" smtClean="0"/>
+              <a:rPr lang="en-US"/>
               <a:t>Second level</a:t>
             </a:r>
           </a:p>
           <a:p>
             <a:pPr lvl="2"/>
             <a:r>
-              <a:rPr lang="en-US" smtClean="0"/>
+              <a:rPr lang="en-US"/>
               <a:t>Third level</a:t>
             </a:r>
           </a:p>
           <a:p>
             <a:pPr lvl="3"/>
             <a:r>
-              <a:rPr lang="en-US" smtClean="0"/>
+              <a:rPr lang="en-US"/>
               <a:t>Fourth level</a:t>
             </a:r>
           </a:p>
           <a:p>
             <a:pPr lvl="4"/>
             <a:r>
-              <a:rPr lang="en-US" smtClean="0"/>
+              <a:rPr lang="en-US"/>
               <a:t>Fifth level</a:t>
             </a:r>
-            <a:endParaRPr lang="en-US"/>
           </a:p>
         </p:txBody>
       </p:sp>
@@ -1287,38 +1292,37 @@
           <a:p>
             <a:pPr lvl="0"/>
             <a:r>
-              <a:rPr lang="en-US" smtClean="0"/>
+              <a:rPr lang="en-US"/>
               <a:t>Click to edit Master text styles</a:t>
             </a:r>
           </a:p>
           <a:p>
             <a:pPr lvl="1"/>
             <a:r>
-              <a:rPr lang="en-US" smtClean="0"/>
+              <a:rPr lang="en-US"/>
               <a:t>Second level</a:t>
             </a:r>
           </a:p>
           <a:p>
             <a:pPr lvl="2"/>
             <a:r>
-              <a:rPr lang="en-US" smtClean="0"/>
+              <a:rPr lang="en-US"/>
               <a:t>Third level</a:t>
             </a:r>
           </a:p>
           <a:p>
             <a:pPr lvl="3"/>
             <a:r>
-              <a:rPr lang="en-US" smtClean="0"/>
+              <a:rPr lang="en-US"/>
               <a:t>Fourth level</a:t>
             </a:r>
           </a:p>
           <a:p>
             <a:pPr lvl="4"/>
             <a:r>
-              <a:rPr lang="en-US" smtClean="0"/>
+              <a:rPr lang="en-US"/>
               <a:t>Fifth level</a:t>
             </a:r>
-            <a:endParaRPr lang="en-US"/>
           </a:p>
         </p:txBody>
       </p:sp>
@@ -1432,10 +1436,9 @@
           </a:lstStyle>
           <a:p>
             <a:r>
-              <a:rPr lang="en-US" smtClean="0"/>
+              <a:rPr lang="en-US"/>
               <a:t>Click to edit Master title style</a:t>
             </a:r>
-            <a:endParaRPr lang="en-US"/>
           </a:p>
         </p:txBody>
       </p:sp>
@@ -1498,7 +1501,7 @@
           <a:p>
             <a:pPr lvl="0"/>
             <a:r>
-              <a:rPr lang="en-US" smtClean="0"/>
+              <a:rPr lang="en-US"/>
               <a:t>Click to edit Master text styles</a:t>
             </a:r>
           </a:p>
@@ -1554,38 +1557,37 @@
           <a:p>
             <a:pPr lvl="0"/>
             <a:r>
-              <a:rPr lang="en-US" smtClean="0"/>
+              <a:rPr lang="en-US"/>
               <a:t>Click to edit Master text styles</a:t>
             </a:r>
           </a:p>
           <a:p>
             <a:pPr lvl="1"/>
             <a:r>
-              <a:rPr lang="en-US" smtClean="0"/>
+              <a:rPr lang="en-US"/>
               <a:t>Second level</a:t>
             </a:r>
           </a:p>
           <a:p>
             <a:pPr lvl="2"/>
             <a:r>
-              <a:rPr lang="en-US" smtClean="0"/>
+              <a:rPr lang="en-US"/>
               <a:t>Third level</a:t>
             </a:r>
           </a:p>
           <a:p>
             <a:pPr lvl="3"/>
             <a:r>
-              <a:rPr lang="en-US" smtClean="0"/>
+              <a:rPr lang="en-US"/>
               <a:t>Fourth level</a:t>
             </a:r>
           </a:p>
           <a:p>
             <a:pPr lvl="4"/>
             <a:r>
-              <a:rPr lang="en-US" smtClean="0"/>
+              <a:rPr lang="en-US"/>
               <a:t>Fifth level</a:t>
             </a:r>
-            <a:endParaRPr lang="en-US"/>
           </a:p>
         </p:txBody>
       </p:sp>
@@ -1648,7 +1650,7 @@
           <a:p>
             <a:pPr lvl="0"/>
             <a:r>
-              <a:rPr lang="en-US" smtClean="0"/>
+              <a:rPr lang="en-US"/>
               <a:t>Click to edit Master text styles</a:t>
             </a:r>
           </a:p>
@@ -1704,38 +1706,37 @@
           <a:p>
             <a:pPr lvl="0"/>
             <a:r>
-              <a:rPr lang="en-US" smtClean="0"/>
+              <a:rPr lang="en-US"/>
               <a:t>Click to edit Master text styles</a:t>
             </a:r>
           </a:p>
           <a:p>
             <a:pPr lvl="1"/>
             <a:r>
-              <a:rPr lang="en-US" smtClean="0"/>
+              <a:rPr lang="en-US"/>
               <a:t>Second level</a:t>
             </a:r>
           </a:p>
           <a:p>
             <a:pPr lvl="2"/>
             <a:r>
-              <a:rPr lang="en-US" smtClean="0"/>
+              <a:rPr lang="en-US"/>
               <a:t>Third level</a:t>
             </a:r>
           </a:p>
           <a:p>
             <a:pPr lvl="3"/>
             <a:r>
-              <a:rPr lang="en-US" smtClean="0"/>
+              <a:rPr lang="en-US"/>
               <a:t>Fourth level</a:t>
             </a:r>
           </a:p>
           <a:p>
             <a:pPr lvl="4"/>
             <a:r>
-              <a:rPr lang="en-US" smtClean="0"/>
+              <a:rPr lang="en-US"/>
               <a:t>Fifth level</a:t>
             </a:r>
-            <a:endParaRPr lang="en-US"/>
           </a:p>
         </p:txBody>
       </p:sp>
@@ -1845,10 +1846,9 @@
           <a:lstStyle/>
           <a:p>
             <a:r>
-              <a:rPr lang="en-US" smtClean="0"/>
+              <a:rPr lang="en-US"/>
               <a:t>Click to edit Master title style</a:t>
             </a:r>
-            <a:endParaRPr lang="en-US"/>
           </a:p>
         </p:txBody>
       </p:sp>
@@ -2057,10 +2057,9 @@
           </a:lstStyle>
           <a:p>
             <a:r>
-              <a:rPr lang="en-US" smtClean="0"/>
+              <a:rPr lang="en-US"/>
               <a:t>Click to edit Master title style</a:t>
             </a:r>
-            <a:endParaRPr lang="en-US"/>
           </a:p>
         </p:txBody>
       </p:sp>
@@ -2114,38 +2113,37 @@
           <a:p>
             <a:pPr lvl="0"/>
             <a:r>
-              <a:rPr lang="en-US" smtClean="0"/>
+              <a:rPr lang="en-US"/>
               <a:t>Click to edit Master text styles</a:t>
             </a:r>
           </a:p>
           <a:p>
             <a:pPr lvl="1"/>
             <a:r>
-              <a:rPr lang="en-US" smtClean="0"/>
+              <a:rPr lang="en-US"/>
               <a:t>Second level</a:t>
             </a:r>
           </a:p>
           <a:p>
             <a:pPr lvl="2"/>
             <a:r>
-              <a:rPr lang="en-US" smtClean="0"/>
+              <a:rPr lang="en-US"/>
               <a:t>Third level</a:t>
             </a:r>
           </a:p>
           <a:p>
             <a:pPr lvl="3"/>
             <a:r>
-              <a:rPr lang="en-US" smtClean="0"/>
+              <a:rPr lang="en-US"/>
               <a:t>Fourth level</a:t>
             </a:r>
           </a:p>
           <a:p>
             <a:pPr lvl="4"/>
             <a:r>
-              <a:rPr lang="en-US" smtClean="0"/>
+              <a:rPr lang="en-US"/>
               <a:t>Fifth level</a:t>
             </a:r>
-            <a:endParaRPr lang="en-US"/>
           </a:p>
         </p:txBody>
       </p:sp>
@@ -2208,7 +2206,7 @@
           <a:p>
             <a:pPr lvl="0"/>
             <a:r>
-              <a:rPr lang="en-US" smtClean="0"/>
+              <a:rPr lang="en-US"/>
               <a:t>Click to edit Master text styles</a:t>
             </a:r>
           </a:p>
@@ -2329,10 +2327,9 @@
           </a:lstStyle>
           <a:p>
             <a:r>
-              <a:rPr lang="en-US" smtClean="0"/>
+              <a:rPr lang="en-US"/>
               <a:t>Click to edit Master title style</a:t>
             </a:r>
-            <a:endParaRPr lang="en-US"/>
           </a:p>
         </p:txBody>
       </p:sp>
@@ -2456,7 +2453,7 @@
           <a:p>
             <a:pPr lvl="0"/>
             <a:r>
-              <a:rPr lang="en-US" smtClean="0"/>
+              <a:rPr lang="en-US"/>
               <a:t>Click to edit Master text styles</a:t>
             </a:r>
           </a:p>
@@ -2583,10 +2580,9 @@
           <a:lstStyle/>
           <a:p>
             <a:r>
-              <a:rPr lang="en-US" smtClean="0"/>
+              <a:rPr lang="en-US"/>
               <a:t>Click to edit Master title style</a:t>
             </a:r>
-            <a:endParaRPr lang="en-US"/>
           </a:p>
         </p:txBody>
       </p:sp>
@@ -2617,38 +2613,37 @@
           <a:p>
             <a:pPr lvl="0"/>
             <a:r>
-              <a:rPr lang="en-US" smtClean="0"/>
+              <a:rPr lang="en-US"/>
               <a:t>Click to edit Master text styles</a:t>
             </a:r>
           </a:p>
           <a:p>
             <a:pPr lvl="1"/>
             <a:r>
-              <a:rPr lang="en-US" smtClean="0"/>
+              <a:rPr lang="en-US"/>
               <a:t>Second level</a:t>
             </a:r>
           </a:p>
           <a:p>
             <a:pPr lvl="2"/>
             <a:r>
-              <a:rPr lang="en-US" smtClean="0"/>
+              <a:rPr lang="en-US"/>
               <a:t>Third level</a:t>
             </a:r>
           </a:p>
           <a:p>
             <a:pPr lvl="3"/>
             <a:r>
-              <a:rPr lang="en-US" smtClean="0"/>
+              <a:rPr lang="en-US"/>
               <a:t>Fourth level</a:t>
             </a:r>
           </a:p>
           <a:p>
             <a:pPr lvl="4"/>
             <a:r>
-              <a:rPr lang="en-US" smtClean="0"/>
+              <a:rPr lang="en-US"/>
               <a:t>Fifth level</a:t>
             </a:r>
-            <a:endParaRPr lang="en-US"/>
           </a:p>
         </p:txBody>
       </p:sp>
@@ -3073,10 +3068,9 @@
           <a:lstStyle/>
           <a:p>
             <a:r>
-              <a:rPr lang="en-US" dirty="0" smtClean="0"/>
+              <a:rPr lang="en-US" b="1" dirty="0"/>
               <a:t>Constrains in wheat production</a:t>
             </a:r>
-            <a:endParaRPr lang="en-US" dirty="0"/>
           </a:p>
         </p:txBody>
       </p:sp>
@@ -3199,8 +3193,20 @@
             <a:tbl>
               <a:tblPr/>
               <a:tblGrid>
-                <a:gridCol w="4068452"/>
-                <a:gridCol w="4068452"/>
+                <a:gridCol w="4068452">
+                  <a:extLst>
+                    <a:ext uri="{9D8B030D-6E8A-4147-A177-3AD203B41FA5}">
+                      <a16:colId xmlns:a16="http://schemas.microsoft.com/office/drawing/2014/main" val="20000"/>
+                    </a:ext>
+                  </a:extLst>
+                </a:gridCol>
+                <a:gridCol w="4068452">
+                  <a:extLst>
+                    <a:ext uri="{9D8B030D-6E8A-4147-A177-3AD203B41FA5}">
+                      <a16:colId xmlns:a16="http://schemas.microsoft.com/office/drawing/2014/main" val="20001"/>
+                    </a:ext>
+                  </a:extLst>
+                </a:gridCol>
               </a:tblGrid>
               <a:tr h="132151">
                 <a:tc>
@@ -3257,6 +3263,11 @@
                     </a:lnB>
                   </a:tcPr>
                 </a:tc>
+                <a:extLst>
+                  <a:ext uri="{0D108BD9-81ED-4DB2-BD59-A6C34878D82A}">
+                    <a16:rowId xmlns:a16="http://schemas.microsoft.com/office/drawing/2014/main" val="10000"/>
+                  </a:ext>
+                </a:extLst>
               </a:tr>
               <a:tr h="1123291">
                 <a:tc>
@@ -3325,6 +3336,11 @@
                     </a:lnB>
                   </a:tcPr>
                 </a:tc>
+                <a:extLst>
+                  <a:ext uri="{0D108BD9-81ED-4DB2-BD59-A6C34878D82A}">
+                    <a16:rowId xmlns:a16="http://schemas.microsoft.com/office/drawing/2014/main" val="10001"/>
+                  </a:ext>
+                </a:extLst>
               </a:tr>
               <a:tr h="825948">
                 <a:tc>
@@ -3397,6 +3413,11 @@
                     </a:lnB>
                   </a:tcPr>
                 </a:tc>
+                <a:extLst>
+                  <a:ext uri="{0D108BD9-81ED-4DB2-BD59-A6C34878D82A}">
+                    <a16:rowId xmlns:a16="http://schemas.microsoft.com/office/drawing/2014/main" val="10002"/>
+                  </a:ext>
+                </a:extLst>
               </a:tr>
               <a:tr h="1321519">
                 <a:tc>
@@ -3453,6 +3474,11 @@
                     </a:lnB>
                   </a:tcPr>
                 </a:tc>
+                <a:extLst>
+                  <a:ext uri="{0D108BD9-81ED-4DB2-BD59-A6C34878D82A}">
+                    <a16:rowId xmlns:a16="http://schemas.microsoft.com/office/drawing/2014/main" val="10003"/>
+                  </a:ext>
+                </a:extLst>
               </a:tr>
               <a:tr h="1123291">
                 <a:tc>
@@ -3509,6 +3535,11 @@
                     </a:lnB>
                   </a:tcPr>
                 </a:tc>
+                <a:extLst>
+                  <a:ext uri="{0D108BD9-81ED-4DB2-BD59-A6C34878D82A}">
+                    <a16:rowId xmlns:a16="http://schemas.microsoft.com/office/drawing/2014/main" val="10004"/>
+                  </a:ext>
+                </a:extLst>
               </a:tr>
               <a:tr h="1123291">
                 <a:tc>
@@ -3573,6 +3604,11 @@
                     </a:lnB>
                   </a:tcPr>
                 </a:tc>
+                <a:extLst>
+                  <a:ext uri="{0D108BD9-81ED-4DB2-BD59-A6C34878D82A}">
+                    <a16:rowId xmlns:a16="http://schemas.microsoft.com/office/drawing/2014/main" val="10005"/>
+                  </a:ext>
+                </a:extLst>
               </a:tr>
             </a:tbl>
           </a:graphicData>
@@ -3621,10 +3657,9 @@
           <a:lstStyle/>
           <a:p>
             <a:r>
-              <a:rPr lang="en-US" dirty="0" smtClean="0"/>
+              <a:rPr lang="en-US" dirty="0"/>
               <a:t>Wheat frontline demonstrations (WFLDs) during 2018-19</a:t>
             </a:r>
-            <a:endParaRPr lang="en-US" dirty="0"/>
           </a:p>
         </p:txBody>
       </p:sp>
@@ -3646,10 +3681,9 @@
           <a:lstStyle/>
           <a:p>
             <a:r>
-              <a:rPr lang="en-US" dirty="0" smtClean="0"/>
+              <a:rPr lang="en-US" dirty="0"/>
               <a:t>FLD - Front Line demonstrations(FLDs) is a unique approach to provide an direct interface between researcher and farmers as the scientists are directly involved in planning, execution and monitoring of the demonstrations for the technologies developed by them and get direct feedback from the farmers’ field about the crops like wheat, rice and pulses production in general and technology being demonstrated in particular.</a:t>
             </a:r>
-            <a:endParaRPr lang="en-US" dirty="0"/>
           </a:p>
         </p:txBody>
       </p:sp>
@@ -3694,10 +3728,9 @@
           <a:lstStyle/>
           <a:p>
             <a:r>
-              <a:rPr lang="en-US" dirty="0" smtClean="0"/>
+              <a:rPr lang="en-US" dirty="0"/>
               <a:t>OBJECTIVES</a:t>
             </a:r>
-            <a:endParaRPr lang="en-US" dirty="0"/>
           </a:p>
         </p:txBody>
       </p:sp>
@@ -3719,22 +3752,21 @@
           <a:lstStyle/>
           <a:p>
             <a:r>
-              <a:rPr lang="en-US" dirty="0" smtClean="0"/>
+              <a:rPr lang="en-US" dirty="0"/>
               <a:t>To demonstrate improved Crop Production Technologies of Rice, Wheat and Pulses on the farmers’ fields; </a:t>
             </a:r>
           </a:p>
           <a:p>
             <a:r>
-              <a:rPr lang="en-US" dirty="0" smtClean="0"/>
+              <a:rPr lang="en-US" dirty="0"/>
               <a:t>To popularize the newly notified and improved varieties/technologies for varietal diversification and efficient management of resources. </a:t>
             </a:r>
           </a:p>
           <a:p>
             <a:r>
-              <a:rPr lang="en-US" dirty="0" smtClean="0"/>
+              <a:rPr lang="en-US" dirty="0"/>
               <a:t>To bring synergy among planers, researchers, farmers and industry for parable interface through seminars/symposium on emerging themes of importance in the field of Rice, Wheat and Pulses production for deciding strategies for development of these crops. </a:t>
             </a:r>
-            <a:endParaRPr lang="en-US" dirty="0"/>
           </a:p>
         </p:txBody>
       </p:sp>
@@ -3919,43 +3951,22 @@
               <a:rPr lang="en-US" b="1" dirty="0"/>
               <a:t>Northern Hills Zone (NHZ): </a:t>
             </a:r>
-            <a:endParaRPr lang="en-US" b="1" dirty="0" smtClean="0"/>
           </a:p>
           <a:p>
             <a:pPr>
               <a:buNone/>
             </a:pPr>
             <a:r>
-              <a:rPr lang="en-US" dirty="0" smtClean="0"/>
-              <a:t>In </a:t>
-            </a:r>
-            <a:r>
-              <a:rPr lang="en-US" dirty="0"/>
-              <a:t>NHZ, small </a:t>
-            </a:r>
-            <a:r>
-              <a:rPr lang="en-US" dirty="0" smtClean="0"/>
-              <a:t>land holding</a:t>
-            </a:r>
-            <a:r>
-              <a:rPr lang="en-US" dirty="0"/>
-              <a:t>, high cost of inputs, untimely </a:t>
-            </a:r>
-            <a:r>
-              <a:rPr lang="en-US" dirty="0" smtClean="0"/>
-              <a:t>rain, </a:t>
-            </a:r>
-            <a:r>
-              <a:rPr lang="en-US" i="1" dirty="0" err="1" smtClean="0"/>
+              <a:rPr lang="en-US" dirty="0"/>
+              <a:t>In NHZ, small land holding, high cost of inputs, untimely rain, </a:t>
+            </a:r>
+            <a:r>
+              <a:rPr lang="en-US" i="1" dirty="0" err="1"/>
               <a:t>Phalaris</a:t>
             </a:r>
             <a:r>
-              <a:rPr lang="en-US" i="1" dirty="0" smtClean="0"/>
-              <a:t> minor</a:t>
-            </a:r>
-            <a:r>
               <a:rPr lang="en-US" i="1" dirty="0"/>
-              <a:t>, non availability of </a:t>
+              <a:t> minor, non availability of </a:t>
             </a:r>
             <a:r>
               <a:rPr lang="en-US" i="1" dirty="0" err="1"/>
@@ -3963,27 +3974,11 @@
             </a:r>
             <a:r>
               <a:rPr lang="en-US" i="1" dirty="0"/>
-              <a:t> were the </a:t>
-            </a:r>
-            <a:r>
-              <a:rPr lang="en-US" i="1" dirty="0" smtClean="0"/>
-              <a:t>major </a:t>
-            </a:r>
-            <a:r>
-              <a:rPr lang="en-US" dirty="0" smtClean="0"/>
-              <a:t>constraints </a:t>
-            </a:r>
-            <a:r>
-              <a:rPr lang="en-US" dirty="0"/>
-              <a:t>faced by the farmers </a:t>
-            </a:r>
-            <a:r>
-              <a:rPr lang="en-US" dirty="0" smtClean="0"/>
-              <a:t>of northern hills zone</a:t>
-            </a:r>
-            <a:r>
-              <a:rPr lang="en-US" dirty="0"/>
-              <a:t>.</a:t>
+              <a:t> were the major </a:t>
+            </a:r>
+            <a:r>
+              <a:rPr lang="en-US" dirty="0"/>
+              <a:t>constraints faced by the farmers of northern hills zone.</a:t>
             </a:r>
           </a:p>
         </p:txBody>
@@ -4054,11 +4049,7 @@
             </a:pPr>
             <a:r>
               <a:rPr lang="en-US" b="1" dirty="0"/>
-              <a:t>North Eastern Plains Zone (NEPZ</a:t>
-            </a:r>
-            <a:r>
-              <a:rPr lang="en-US" b="1" dirty="0" smtClean="0"/>
-              <a:t>):</a:t>
+              <a:t>North Eastern Plains Zone (NEPZ):</a:t>
             </a:r>
           </a:p>
           <a:p>
@@ -4088,24 +4079,12 @@
               <a:t>hiring charges, non-availability of farm </a:t>
             </a:r>
             <a:r>
-              <a:rPr lang="en-US" dirty="0" err="1" smtClean="0"/>
+              <a:rPr lang="en-US" dirty="0" err="1"/>
               <a:t>labours,erratic</a:t>
             </a:r>
             <a:r>
-              <a:rPr lang="en-US" dirty="0" smtClean="0"/>
-              <a:t> power supply</a:t>
-            </a:r>
-            <a:r>
-              <a:rPr lang="en-US" dirty="0"/>
-              <a:t>, poor information delivery </a:t>
-            </a:r>
-            <a:r>
-              <a:rPr lang="en-US" dirty="0" smtClean="0"/>
-              <a:t>by the </a:t>
-            </a:r>
-            <a:r>
-              <a:rPr lang="en-US" dirty="0"/>
-              <a:t>state extension machinery and </a:t>
+              <a:rPr lang="en-US" dirty="0"/>
+              <a:t> power supply, poor information delivery by the state extension machinery and </a:t>
             </a:r>
             <a:r>
               <a:rPr lang="en-US" i="1" dirty="0" err="1"/>
@@ -4113,14 +4092,10 @@
             </a:r>
             <a:r>
               <a:rPr lang="en-US" i="1" dirty="0"/>
-              <a:t> </a:t>
-            </a:r>
-            <a:r>
-              <a:rPr lang="en-US" i="1" dirty="0" smtClean="0"/>
-              <a:t>minor </a:t>
-            </a:r>
-            <a:r>
-              <a:rPr lang="en-US" dirty="0" smtClean="0"/>
+              <a:t> minor </a:t>
+            </a:r>
+            <a:r>
+              <a:rPr lang="en-US" dirty="0"/>
               <a:t>were </a:t>
             </a:r>
             <a:r>
@@ -4129,11 +4104,7 @@
             </a:r>
             <a:r>
               <a:rPr lang="en-US" dirty="0"/>
-              <a:t>􀃶ed</a:t>
-            </a:r>
-            <a:r>
-              <a:rPr lang="en-US" dirty="0" smtClean="0"/>
-              <a:t>.</a:t>
+              <a:t>􀃶ed.</a:t>
             </a:r>
           </a:p>
           <a:p>
@@ -4150,31 +4121,7 @@
             </a:r>
             <a:r>
               <a:rPr lang="en-US" dirty="0"/>
-              <a:t> from </a:t>
-            </a:r>
-            <a:r>
-              <a:rPr lang="en-US" dirty="0" smtClean="0"/>
-              <a:t>eastern zone </a:t>
-            </a:r>
-            <a:r>
-              <a:rPr lang="en-US" dirty="0"/>
-              <a:t>to other parts </a:t>
-            </a:r>
-            <a:r>
-              <a:rPr lang="en-US" dirty="0" smtClean="0"/>
-              <a:t>of the </a:t>
-            </a:r>
-            <a:r>
-              <a:rPr lang="en-US" dirty="0"/>
-              <a:t>country is </a:t>
-            </a:r>
-            <a:r>
-              <a:rPr lang="en-US" dirty="0" smtClean="0"/>
-              <a:t>creating scarcity </a:t>
-            </a:r>
-            <a:r>
-              <a:rPr lang="en-US" dirty="0"/>
-              <a:t>of agricultural </a:t>
+              <a:t> from eastern zone to other parts of the country is creating scarcity of agricultural </a:t>
             </a:r>
             <a:r>
               <a:rPr lang="en-US" dirty="0" err="1"/>
@@ -4182,11 +4129,7 @@
             </a:r>
             <a:r>
               <a:rPr lang="en-US" dirty="0"/>
-              <a:t> in this </a:t>
-            </a:r>
-            <a:r>
-              <a:rPr lang="en-US" dirty="0" smtClean="0"/>
-              <a:t>zone.</a:t>
+              <a:t> in this zone.</a:t>
             </a:r>
           </a:p>
           <a:p>
@@ -4194,20 +4137,8 @@
               <a:buNone/>
             </a:pPr>
             <a:r>
-              <a:rPr lang="en-US" dirty="0" smtClean="0"/>
-              <a:t> Marketing </a:t>
-            </a:r>
-            <a:r>
-              <a:rPr lang="en-US" dirty="0"/>
-              <a:t>of wheat is still a concern for this </a:t>
-            </a:r>
-            <a:r>
-              <a:rPr lang="en-US" dirty="0" smtClean="0"/>
-              <a:t>region for </a:t>
-            </a:r>
-            <a:r>
-              <a:rPr lang="en-US" dirty="0"/>
-              <a:t>better price realization and pro􀃶</a:t>
+              <a:rPr lang="en-US" dirty="0"/>
+              <a:t> Marketing of wheat is still a concern for this region for better price realization and pro􀃶</a:t>
             </a:r>
             <a:r>
               <a:rPr lang="en-US" dirty="0" err="1"/>
@@ -4286,11 +4217,7 @@
             </a:pPr>
             <a:r>
               <a:rPr lang="en-US" b="1" dirty="0"/>
-              <a:t>North Western Plains Zone (NWPZ</a:t>
-            </a:r>
-            <a:r>
-              <a:rPr lang="en-US" b="1" dirty="0" smtClean="0"/>
-              <a:t>): </a:t>
+              <a:t>North Western Plains Zone (NWPZ): </a:t>
             </a:r>
           </a:p>
           <a:p>
@@ -4298,16 +4225,8 @@
               <a:buNone/>
             </a:pPr>
             <a:r>
-              <a:rPr lang="en-US" dirty="0" smtClean="0"/>
-              <a:t>non-availability </a:t>
-            </a:r>
-            <a:r>
-              <a:rPr lang="en-US" dirty="0"/>
-              <a:t>of seed of newly </a:t>
-            </a:r>
-            <a:r>
-              <a:rPr lang="en-US" dirty="0" smtClean="0"/>
-              <a:t>released varieties was </a:t>
+              <a:rPr lang="en-US" dirty="0"/>
+              <a:t>non-availability of seed of newly released varieties was </a:t>
             </a:r>
             <a:r>
               <a:rPr lang="en-US" dirty="0" err="1"/>
@@ -4323,11 +4242,7 @@
             </a:r>
             <a:r>
               <a:rPr lang="en-US" dirty="0"/>
-              <a:t> as the most serious constraint</a:t>
-            </a:r>
-            <a:r>
-              <a:rPr lang="en-US" dirty="0" smtClean="0"/>
-              <a:t>.</a:t>
+              <a:t> as the most serious constraint.</a:t>
             </a:r>
           </a:p>
           <a:p>
@@ -4335,12 +4250,8 @@
               <a:buNone/>
             </a:pPr>
             <a:r>
-              <a:rPr lang="en-US" dirty="0" smtClean="0"/>
-              <a:t>In addition </a:t>
-            </a:r>
-            <a:r>
-              <a:rPr lang="en-US" dirty="0"/>
-              <a:t>to this, small land holdings, declining</a:t>
+              <a:rPr lang="en-US" dirty="0"/>
+              <a:t>In addition to this, small land holdings, declining</a:t>
             </a:r>
           </a:p>
           <a:p>
@@ -4349,15 +4260,7 @@
             </a:pPr>
             <a:r>
               <a:rPr lang="en-US" dirty="0"/>
-              <a:t>water table, low organic matter in the soil were </a:t>
-            </a:r>
-            <a:r>
-              <a:rPr lang="en-US" dirty="0" smtClean="0"/>
-              <a:t>also given </a:t>
-            </a:r>
-            <a:r>
-              <a:rPr lang="en-US" dirty="0"/>
-              <a:t>high priority.</a:t>
+              <a:t>water table, low organic matter in the soil were also given high priority.</a:t>
             </a:r>
           </a:p>
         </p:txBody>
@@ -4428,11 +4331,7 @@
             </a:pPr>
             <a:r>
               <a:rPr lang="en-US" b="1" dirty="0"/>
-              <a:t>Central Zone (CZ</a:t>
-            </a:r>
-            <a:r>
-              <a:rPr lang="en-US" b="1" dirty="0" smtClean="0"/>
-              <a:t>):</a:t>
+              <a:t>Central Zone (CZ):</a:t>
             </a:r>
           </a:p>
           <a:p>
@@ -4441,39 +4340,7 @@
             </a:pPr>
             <a:r>
               <a:rPr lang="en-US" dirty="0"/>
-              <a:t>In central zone, high cost </a:t>
-            </a:r>
-            <a:r>
-              <a:rPr lang="en-US" dirty="0" smtClean="0"/>
-              <a:t>of inputs</a:t>
-            </a:r>
-            <a:r>
-              <a:rPr lang="en-US" dirty="0"/>
-              <a:t>, decline in water table, low price of </a:t>
-            </a:r>
-            <a:r>
-              <a:rPr lang="en-US" dirty="0" smtClean="0"/>
-              <a:t>wheat, small </a:t>
-            </a:r>
-            <a:r>
-              <a:rPr lang="en-US" dirty="0"/>
-              <a:t>land holdings and problem in marketing </a:t>
-            </a:r>
-            <a:r>
-              <a:rPr lang="en-US" dirty="0" smtClean="0"/>
-              <a:t>were the </a:t>
-            </a:r>
-            <a:r>
-              <a:rPr lang="en-US" dirty="0"/>
-              <a:t>major constraints faced by the farmers. </a:t>
-            </a:r>
-            <a:r>
-              <a:rPr lang="en-US" dirty="0" smtClean="0"/>
-              <a:t>This zone </a:t>
-            </a:r>
-            <a:r>
-              <a:rPr lang="en-US" dirty="0"/>
-              <a:t>has been </a:t>
+              <a:t>In central zone, high cost of inputs, decline in water table, low price of wheat, small land holdings and problem in marketing were the major constraints faced by the farmers. This zone has been </a:t>
             </a:r>
             <a:r>
               <a:rPr lang="en-US" dirty="0" err="1"/>
@@ -4489,47 +4356,7 @@
             </a:r>
             <a:r>
               <a:rPr lang="en-US" dirty="0"/>
-              <a:t> as export zone for </a:t>
-            </a:r>
-            <a:r>
-              <a:rPr lang="en-US" dirty="0" smtClean="0"/>
-              <a:t>quality wheat</a:t>
-            </a:r>
-            <a:r>
-              <a:rPr lang="en-US" dirty="0"/>
-              <a:t>. </a:t>
-            </a:r>
-            <a:r>
-              <a:rPr lang="en-US" dirty="0" smtClean="0"/>
-              <a:t>The processing </a:t>
-            </a:r>
-            <a:r>
-              <a:rPr lang="en-US" dirty="0"/>
-              <a:t>quality of wheat in this </a:t>
-            </a:r>
-            <a:r>
-              <a:rPr lang="en-US" dirty="0" smtClean="0"/>
-              <a:t>zone is </a:t>
-            </a:r>
-            <a:r>
-              <a:rPr lang="en-US" dirty="0"/>
-              <a:t>better than that of NEPZ and NWPZ. The </a:t>
-            </a:r>
-            <a:r>
-              <a:rPr lang="en-US" dirty="0" smtClean="0"/>
-              <a:t>above said </a:t>
-            </a:r>
-            <a:r>
-              <a:rPr lang="en-US" dirty="0"/>
-              <a:t>constraints need to be addressed seriously </a:t>
-            </a:r>
-            <a:r>
-              <a:rPr lang="en-US" dirty="0" smtClean="0"/>
-              <a:t>for more </a:t>
-            </a:r>
-            <a:r>
-              <a:rPr lang="en-US" dirty="0"/>
-              <a:t>income.</a:t>
+              <a:t> as export zone for quality wheat. The processing quality of wheat in this zone is better than that of NEPZ and NWPZ. The above said constraints need to be addressed seriously for more income.</a:t>
             </a:r>
           </a:p>
         </p:txBody>
@@ -4651,11 +4478,7 @@
             </a:pPr>
             <a:r>
               <a:rPr lang="en-US" b="1" dirty="0"/>
-              <a:t>Peninsular Zone (PZ</a:t>
-            </a:r>
-            <a:r>
-              <a:rPr lang="en-US" b="1" dirty="0" smtClean="0"/>
-              <a:t>):</a:t>
+              <a:t>Peninsular Zone (PZ):</a:t>
             </a:r>
           </a:p>
           <a:p>
@@ -4664,73 +4487,9 @@
             </a:pPr>
             <a:r>
               <a:rPr lang="en-US" dirty="0"/>
-              <a:t>In peninsular zone, </a:t>
-            </a:r>
-            <a:r>
-              <a:rPr lang="en-US" dirty="0" smtClean="0"/>
-              <a:t>higher rate </a:t>
-            </a:r>
-            <a:r>
-              <a:rPr lang="en-US" dirty="0"/>
-              <a:t>of custom hiring, low price of wheat, </a:t>
-            </a:r>
-            <a:r>
-              <a:rPr lang="en-US" dirty="0" smtClean="0"/>
-              <a:t>water </a:t>
-            </a:r>
-            <a:r>
-              <a:rPr lang="en-US" dirty="0"/>
-              <a:t>stress, high cost of inputs and high temperature </a:t>
-            </a:r>
-            <a:r>
-              <a:rPr lang="en-US" dirty="0" smtClean="0"/>
-              <a:t>at maturity </a:t>
-            </a:r>
-            <a:r>
-              <a:rPr lang="en-US" dirty="0"/>
-              <a:t>were the major constraints of this zone. </a:t>
-            </a:r>
-            <a:r>
-              <a:rPr lang="en-US" dirty="0" smtClean="0"/>
-              <a:t>For making </a:t>
-            </a:r>
-            <a:r>
-              <a:rPr lang="en-US" dirty="0"/>
-              <a:t>wheat cultivation remunerative, there is </a:t>
-            </a:r>
-            <a:r>
-              <a:rPr lang="en-US" dirty="0" smtClean="0"/>
-              <a:t>a need </a:t>
-            </a:r>
-            <a:r>
-              <a:rPr lang="en-US" dirty="0"/>
-              <a:t>to develop proper market. For better </a:t>
-            </a:r>
-            <a:r>
-              <a:rPr lang="en-US" dirty="0" smtClean="0"/>
-              <a:t>price realization </a:t>
-            </a:r>
-            <a:r>
-              <a:rPr lang="en-US" dirty="0"/>
-              <a:t>farmers need to be educated </a:t>
-            </a:r>
-            <a:r>
-              <a:rPr lang="en-US" dirty="0" smtClean="0"/>
-              <a:t>about selling </a:t>
-            </a:r>
-            <a:r>
-              <a:rPr lang="en-US" dirty="0"/>
-              <a:t>of their agricultural produce through </a:t>
-            </a:r>
-            <a:r>
-              <a:rPr lang="en-US" dirty="0" smtClean="0"/>
-              <a:t>e-NAM portal</a:t>
-            </a:r>
-            <a:r>
-              <a:rPr lang="en-US" dirty="0"/>
-              <a:t>.</a:t>
-            </a:r>
-            <a:endParaRPr lang="en-US" b="1" dirty="0" smtClean="0"/>
+              <a:t>In peninsular zone, higher rate of custom hiring, low price of wheat, water stress, high cost of inputs and high temperature at maturity were the major constraints of this zone. For making wheat cultivation remunerative, there is a need to develop proper market. For better price realization farmers need to be educated about selling of their agricultural produce through e-NAM portal.</a:t>
+            </a:r>
+            <a:endParaRPr lang="en-US" b="1" dirty="0"/>
           </a:p>
         </p:txBody>
       </p:sp>
@@ -4809,30 +4568,10 @@
             </a:pPr>
             <a:r>
               <a:rPr lang="en-US" dirty="0"/>
-              <a:t>across zones revealed that high cost </a:t>
-            </a:r>
-            <a:r>
-              <a:rPr lang="en-US" dirty="0" smtClean="0"/>
-              <a:t>of inputs</a:t>
-            </a:r>
-            <a:r>
-              <a:rPr lang="en-US" dirty="0"/>
-              <a:t>, small land holding, non-availability of </a:t>
-            </a:r>
-            <a:r>
-              <a:rPr lang="en-US" dirty="0" smtClean="0"/>
-              <a:t>seed of </a:t>
-            </a:r>
-            <a:r>
-              <a:rPr lang="en-US" dirty="0"/>
-              <a:t>newly released varieties, non-availability </a:t>
-            </a:r>
-            <a:r>
-              <a:rPr lang="en-US" dirty="0" smtClean="0"/>
-              <a:t>of </a:t>
-            </a:r>
-            <a:r>
-              <a:rPr lang="en-US" dirty="0" err="1" smtClean="0"/>
+              <a:t>across zones revealed that high cost of inputs, small land holding, non-availability of seed of newly released varieties, non-availability of </a:t>
+            </a:r>
+            <a:r>
+              <a:rPr lang="en-US" dirty="0" err="1"/>
               <a:t>labour</a:t>
             </a:r>
             <a:r>
@@ -4840,20 +4579,12 @@
               <a:t>; higher customer hiring rate of land </a:t>
             </a:r>
             <a:r>
-              <a:rPr lang="en-US" dirty="0" err="1" smtClean="0"/>
+              <a:rPr lang="en-US" dirty="0" err="1"/>
               <a:t>levelling</a:t>
             </a:r>
             <a:r>
-              <a:rPr lang="en-US" dirty="0" smtClean="0"/>
-              <a:t>, field </a:t>
-            </a:r>
-            <a:r>
-              <a:rPr lang="en-US" dirty="0"/>
-              <a:t>preparation, sowing, harvesting and </a:t>
-            </a:r>
-            <a:r>
-              <a:rPr lang="en-US" dirty="0" smtClean="0"/>
-              <a:t>threshing; and </a:t>
+              <a:rPr lang="en-US" dirty="0"/>
+              <a:t>, field preparation, sowing, harvesting and threshing; and </a:t>
             </a:r>
             <a:r>
               <a:rPr lang="en-US" i="1" dirty="0" err="1"/>
@@ -4861,27 +4592,11 @@
             </a:r>
             <a:r>
               <a:rPr lang="en-US" i="1" dirty="0"/>
-              <a:t> minor were the major constraints </a:t>
-            </a:r>
-            <a:r>
-              <a:rPr lang="en-US" i="1" dirty="0" smtClean="0"/>
-              <a:t>of </a:t>
-            </a:r>
-            <a:r>
-              <a:rPr lang="en-US" dirty="0" smtClean="0"/>
-              <a:t>wheat </a:t>
-            </a:r>
-            <a:r>
-              <a:rPr lang="en-US" dirty="0"/>
-              <a:t>production as </a:t>
-            </a:r>
-            <a:r>
-              <a:rPr lang="en-US" dirty="0" smtClean="0"/>
-              <a:t>identified </a:t>
-            </a:r>
-            <a:r>
-              <a:rPr lang="en-US" dirty="0"/>
-              <a:t>under FLDs.</a:t>
+              <a:t> minor were the major constraints of </a:t>
+            </a:r>
+            <a:r>
+              <a:rPr lang="en-US" dirty="0"/>
+              <a:t>wheat production as identified under FLDs.</a:t>
             </a:r>
           </a:p>
         </p:txBody>
@@ -4938,143 +4653,7 @@
             </a:pPr>
             <a:r>
               <a:rPr lang="en-US" dirty="0"/>
-              <a:t>Farmers need to be educated and trained on </a:t>
-            </a:r>
-            <a:r>
-              <a:rPr lang="en-US" dirty="0" smtClean="0"/>
-              <a:t>recent wheat </a:t>
-            </a:r>
-            <a:r>
-              <a:rPr lang="en-US" dirty="0"/>
-              <a:t>production technologies, complete </a:t>
-            </a:r>
-            <a:r>
-              <a:rPr lang="en-US" dirty="0" smtClean="0"/>
-              <a:t>package of </a:t>
-            </a:r>
-            <a:r>
-              <a:rPr lang="en-US" dirty="0"/>
-              <a:t>practices and soil health management. There is </a:t>
-            </a:r>
-            <a:r>
-              <a:rPr lang="en-US" dirty="0" smtClean="0"/>
-              <a:t>a need </a:t>
-            </a:r>
-            <a:r>
-              <a:rPr lang="en-US" dirty="0"/>
-              <a:t>of government intervention to ensure </a:t>
-            </a:r>
-            <a:r>
-              <a:rPr lang="en-US" dirty="0" smtClean="0"/>
-              <a:t>quality seeds </a:t>
-            </a:r>
-            <a:r>
-              <a:rPr lang="en-US" dirty="0"/>
-              <a:t>as well as quality inputs. Farmers need to </a:t>
-            </a:r>
-            <a:r>
-              <a:rPr lang="en-US" dirty="0" smtClean="0"/>
-              <a:t>be updated </a:t>
-            </a:r>
-            <a:r>
-              <a:rPr lang="en-US" dirty="0"/>
-              <a:t>on impact of climate change on </a:t>
-            </a:r>
-            <a:r>
-              <a:rPr lang="en-US" dirty="0" smtClean="0"/>
-              <a:t>wheat cultivation </a:t>
-            </a:r>
-            <a:r>
-              <a:rPr lang="en-US" dirty="0"/>
-              <a:t>and what are the coping strategies </a:t>
-            </a:r>
-            <a:r>
-              <a:rPr lang="en-US" dirty="0" smtClean="0"/>
-              <a:t>they can </a:t>
-            </a:r>
-            <a:r>
-              <a:rPr lang="en-US" dirty="0"/>
-              <a:t>adopt to mitigate it. The concept </a:t>
-            </a:r>
-            <a:r>
-              <a:rPr lang="en-US" dirty="0" smtClean="0"/>
-              <a:t>of conservation </a:t>
-            </a:r>
-            <a:r>
-              <a:rPr lang="en-US" dirty="0"/>
-              <a:t>agriculture and adoption of </a:t>
-            </a:r>
-            <a:r>
-              <a:rPr lang="en-US" dirty="0" smtClean="0"/>
-              <a:t>resource conservation </a:t>
-            </a:r>
-            <a:r>
-              <a:rPr lang="en-US" dirty="0"/>
-              <a:t>technologies at </a:t>
-            </a:r>
-            <a:r>
-              <a:rPr lang="en-US" dirty="0" smtClean="0"/>
-              <a:t>farmer’s field </a:t>
-            </a:r>
-            <a:r>
-              <a:rPr lang="en-US" dirty="0"/>
-              <a:t>can </a:t>
-            </a:r>
-            <a:r>
-              <a:rPr lang="en-US" dirty="0" smtClean="0"/>
-              <a:t>be propagated </a:t>
-            </a:r>
-            <a:r>
-              <a:rPr lang="en-US" dirty="0"/>
-              <a:t>at a larger scale. To ensure better </a:t>
-            </a:r>
-            <a:r>
-              <a:rPr lang="en-US" dirty="0" smtClean="0"/>
-              <a:t>price, farmers </a:t>
-            </a:r>
-            <a:r>
-              <a:rPr lang="en-US" dirty="0"/>
-              <a:t>have to go for quality wheat </a:t>
-            </a:r>
-            <a:r>
-              <a:rPr lang="en-US" dirty="0" smtClean="0"/>
-              <a:t>production. There </a:t>
-            </a:r>
-            <a:r>
-              <a:rPr lang="en-US" dirty="0"/>
-              <a:t>is a need to register wheat growers on </a:t>
-            </a:r>
-            <a:r>
-              <a:rPr lang="en-US" dirty="0" smtClean="0"/>
-              <a:t>e-NAM platform </a:t>
-            </a:r>
-            <a:r>
-              <a:rPr lang="en-US" dirty="0"/>
-              <a:t>for selling of wheat. All the </a:t>
-            </a:r>
-            <a:r>
-              <a:rPr lang="en-US" dirty="0" smtClean="0"/>
-              <a:t>constraints need </a:t>
-            </a:r>
-            <a:r>
-              <a:rPr lang="en-US" dirty="0"/>
-              <a:t>appropriate attention in order to </a:t>
-            </a:r>
-            <a:r>
-              <a:rPr lang="en-US" dirty="0" smtClean="0"/>
-              <a:t>increase wheat </a:t>
-            </a:r>
-            <a:r>
-              <a:rPr lang="en-US" dirty="0"/>
-              <a:t>production in all major wheat </a:t>
-            </a:r>
-            <a:r>
-              <a:rPr lang="en-US" dirty="0" smtClean="0"/>
-              <a:t>producing zones </a:t>
-            </a:r>
-            <a:r>
-              <a:rPr lang="en-US" dirty="0"/>
-              <a:t>of the country.</a:t>
+              <a:t>Farmers need to be educated and trained on recent wheat production technologies, complete package of practices and soil health management. There is a need of government intervention to ensure quality seeds as well as quality inputs. Farmers need to be updated on impact of climate change on wheat cultivation and what are the coping strategies they can adopt to mitigate it. The concept of conservation agriculture and adoption of resource conservation technologies at farmer’s field can be propagated at a larger scale. To ensure better price, farmers have to go for quality wheat production. There is a need to register wheat growers on e-NAM platform for selling of wheat. All the constraints need appropriate attention in order to increase wheat production in all major wheat producing zones of the country.</a:t>
             </a:r>
           </a:p>
         </p:txBody>
@@ -5183,18 +4762,17 @@
           <a:lstStyle/>
           <a:p>
             <a:r>
-              <a:rPr lang="en-US" dirty="0" smtClean="0"/>
+              <a:rPr lang="en-US" dirty="0"/>
               <a:t>Climatic </a:t>
             </a:r>
             <a:r>
-              <a:rPr lang="en-US" dirty="0" err="1" smtClean="0"/>
+              <a:rPr lang="en-US" dirty="0" err="1"/>
               <a:t>vulnerablity</a:t>
             </a:r>
             <a:r>
-              <a:rPr lang="en-US" dirty="0" smtClean="0"/>
+              <a:rPr lang="en-US" dirty="0"/>
               <a:t> </a:t>
             </a:r>
-            <a:endParaRPr lang="en-US" dirty="0"/>
           </a:p>
         </p:txBody>
       </p:sp>
@@ -5216,12 +4794,8 @@
           <a:lstStyle/>
           <a:p>
             <a:r>
-              <a:rPr lang="en-US" dirty="0" smtClean="0"/>
-              <a:t>In </a:t>
-            </a:r>
-            <a:r>
-              <a:rPr lang="en-US" dirty="0"/>
-              <a:t>India a significant part of wheat area is under heat stress, and </a:t>
+              <a:rPr lang="en-US" dirty="0"/>
+              <a:t>In India a significant part of wheat area is under heat stress, and </a:t>
             </a:r>
             <a:r>
               <a:rPr lang="en-US" dirty="0" err="1"/>
@@ -5237,11 +4811,7 @@
             </a:r>
             <a:r>
               <a:rPr lang="en-US" dirty="0"/>
-              <a:t> </a:t>
-            </a:r>
-            <a:r>
-              <a:rPr lang="en-US" dirty="0" smtClean="0"/>
-              <a:t>Plains</a:t>
+              <a:t> Plains</a:t>
             </a:r>
           </a:p>
           <a:p>
@@ -5254,7 +4824,7 @@
               <a:t>tonnes</a:t>
             </a:r>
             <a:r>
-              <a:rPr lang="en-US" dirty="0" smtClean="0"/>
+              <a:rPr lang="en-US" dirty="0"/>
               <a:t>.</a:t>
             </a:r>
           </a:p>
@@ -5748,10 +5318,9 @@
           <a:lstStyle/>
           <a:p>
             <a:r>
-              <a:rPr lang="en-US" dirty="0" smtClean="0"/>
+              <a:rPr lang="en-US" dirty="0"/>
               <a:t>Decline in farm size</a:t>
             </a:r>
-            <a:endParaRPr lang="en-US" dirty="0"/>
           </a:p>
         </p:txBody>
       </p:sp>

</xml_diff>